<commit_message>
Added car models, celica and references files and added ref pictures
</commit_message>
<xml_diff>
--- a/Zombie driving game gdd.pptx
+++ b/Zombie driving game gdd.pptx
@@ -8,22 +8,23 @@
     <p:sldId id="256" r:id="rId5"/>
     <p:sldId id="257" r:id="rId6"/>
     <p:sldId id="268" r:id="rId7"/>
-    <p:sldId id="270" r:id="rId8"/>
-    <p:sldId id="271" r:id="rId9"/>
-    <p:sldId id="272" r:id="rId10"/>
-    <p:sldId id="281" r:id="rId11"/>
-    <p:sldId id="280" r:id="rId12"/>
-    <p:sldId id="282" r:id="rId13"/>
-    <p:sldId id="273" r:id="rId14"/>
-    <p:sldId id="274" r:id="rId15"/>
-    <p:sldId id="275" r:id="rId16"/>
-    <p:sldId id="276" r:id="rId17"/>
-    <p:sldId id="277" r:id="rId18"/>
-    <p:sldId id="278" r:id="rId19"/>
-    <p:sldId id="279" r:id="rId20"/>
-    <p:sldId id="267" r:id="rId21"/>
-    <p:sldId id="265" r:id="rId22"/>
-    <p:sldId id="266" r:id="rId23"/>
+    <p:sldId id="283" r:id="rId8"/>
+    <p:sldId id="270" r:id="rId9"/>
+    <p:sldId id="271" r:id="rId10"/>
+    <p:sldId id="272" r:id="rId11"/>
+    <p:sldId id="281" r:id="rId12"/>
+    <p:sldId id="280" r:id="rId13"/>
+    <p:sldId id="282" r:id="rId14"/>
+    <p:sldId id="273" r:id="rId15"/>
+    <p:sldId id="274" r:id="rId16"/>
+    <p:sldId id="275" r:id="rId17"/>
+    <p:sldId id="276" r:id="rId18"/>
+    <p:sldId id="277" r:id="rId19"/>
+    <p:sldId id="278" r:id="rId20"/>
+    <p:sldId id="279" r:id="rId21"/>
+    <p:sldId id="267" r:id="rId22"/>
+    <p:sldId id="265" r:id="rId23"/>
+    <p:sldId id="266" r:id="rId24"/>
   </p:sldIdLst>
   <p:sldSz cx="9144000" cy="6858000" type="screen4x3"/>
   <p:notesSz cx="6858000" cy="9144000"/>
@@ -2667,7 +2668,7 @@
           <p:cNvPr id="2" name="Title 1">
             <a:extLst>
               <a:ext uri="{FF2B5EF4-FFF2-40B4-BE49-F238E27FC236}">
-                <a16:creationId xmlns:a16="http://schemas.microsoft.com/office/drawing/2014/main" id="{F62F4D7C-1835-6C4D-853F-69162F173922}"/>
+                <a16:creationId xmlns:a16="http://schemas.microsoft.com/office/drawing/2014/main" id="{E47C2959-08B0-A14E-8524-834AAF69BA68}"/>
               </a:ext>
             </a:extLst>
           </p:cNvPr>
@@ -2685,9 +2686,16 @@
           <a:p>
             <a:r>
               <a:rPr lang="fi-FI" dirty="0" err="1"/>
-              <a:t>Art</a:t>
-            </a:r>
-            <a:endParaRPr lang="fi-FI" dirty="0"/>
+              <a:t>Rules</a:t>
+            </a:r>
+            <a:r>
+              <a:rPr lang="fi-FI" dirty="0"/>
+              <a:t> </a:t>
+            </a:r>
+            <a:r>
+              <a:rPr lang="fi-FI"/>
+              <a:t>flowchart</a:t>
+            </a:r>
           </a:p>
         </p:txBody>
       </p:sp>
@@ -2696,7 +2704,7 @@
           <p:cNvPr id="3" name="Content Placeholder 2">
             <a:extLst>
               <a:ext uri="{FF2B5EF4-FFF2-40B4-BE49-F238E27FC236}">
-                <a16:creationId xmlns:a16="http://schemas.microsoft.com/office/drawing/2014/main" id="{375062B3-9444-B54F-9638-F93599D0DBB6}"/>
+                <a16:creationId xmlns:a16="http://schemas.microsoft.com/office/drawing/2014/main" id="{2349ED59-99FD-FE46-8CCC-DC99627F92CE}"/>
               </a:ext>
             </a:extLst>
           </p:cNvPr>
@@ -2712,36 +2720,14 @@
           <a:bodyPr/>
           <a:lstStyle/>
           <a:p>
-            <a:r>
-              <a:rPr lang="fi-FI" dirty="0"/>
-              <a:t>Teemme 3d mallit autoista, hahmoista ja rakennuksista</a:t>
-            </a:r>
-          </a:p>
-          <a:p>
-            <a:r>
-              <a:rPr lang="fi-FI" dirty="0"/>
-              <a:t>Käytämme malleihin </a:t>
-            </a:r>
-            <a:r>
-              <a:rPr lang="fi-FI" dirty="0" err="1"/>
-              <a:t>blenderiä</a:t>
-            </a:r>
-            <a:r>
-              <a:rPr lang="fi-FI" dirty="0"/>
-              <a:t> ja tekstuureihin </a:t>
-            </a:r>
-            <a:r>
-              <a:rPr lang="fi-FI" dirty="0" err="1"/>
-              <a:t>photoshoppia</a:t>
-            </a:r>
-            <a:endParaRPr lang="fi-FI" dirty="0"/>
+            <a:endParaRPr lang="fi-FI"/>
           </a:p>
         </p:txBody>
       </p:sp>
     </p:spTree>
     <p:extLst>
       <p:ext uri="{BB962C8B-B14F-4D97-AF65-F5344CB8AC3E}">
-        <p14:creationId xmlns:p14="http://schemas.microsoft.com/office/powerpoint/2010/main" val="2879112466"/>
+        <p14:creationId xmlns:p14="http://schemas.microsoft.com/office/powerpoint/2010/main" val="839165852"/>
       </p:ext>
     </p:extLst>
   </p:cSld>
@@ -2790,12 +2776,8 @@
           <a:lstStyle/>
           <a:p>
             <a:r>
-              <a:rPr lang="fi-FI" dirty="0"/>
-              <a:t>Sound </a:t>
-            </a:r>
-            <a:r>
               <a:rPr lang="fi-FI" dirty="0" err="1"/>
-              <a:t>effects</a:t>
+              <a:t>Art</a:t>
             </a:r>
             <a:endParaRPr lang="fi-FI" dirty="0"/>
           </a:p>
@@ -2824,15 +2806,34 @@
           <a:p>
             <a:r>
               <a:rPr lang="fi-FI" dirty="0"/>
-              <a:t>Teemme äänitehosteet vielä päättämättömällä sovelluksella</a:t>
-            </a:r>
+              <a:t>Teemme 3d mallit autoista, hahmoista ja rakennuksista</a:t>
+            </a:r>
+          </a:p>
+          <a:p>
+            <a:r>
+              <a:rPr lang="fi-FI" dirty="0"/>
+              <a:t>Käytämme malleihin </a:t>
+            </a:r>
+            <a:r>
+              <a:rPr lang="fi-FI" dirty="0" err="1"/>
+              <a:t>blenderiä</a:t>
+            </a:r>
+            <a:r>
+              <a:rPr lang="fi-FI" dirty="0"/>
+              <a:t> ja tekstuureihin </a:t>
+            </a:r>
+            <a:r>
+              <a:rPr lang="fi-FI" dirty="0" err="1"/>
+              <a:t>photoshoppia</a:t>
+            </a:r>
+            <a:endParaRPr lang="fi-FI" dirty="0"/>
           </a:p>
         </p:txBody>
       </p:sp>
     </p:spTree>
     <p:extLst>
       <p:ext uri="{BB962C8B-B14F-4D97-AF65-F5344CB8AC3E}">
-        <p14:creationId xmlns:p14="http://schemas.microsoft.com/office/powerpoint/2010/main" val="451965084"/>
+        <p14:creationId xmlns:p14="http://schemas.microsoft.com/office/powerpoint/2010/main" val="2879112466"/>
       </p:ext>
     </p:extLst>
   </p:cSld>
@@ -2882,8 +2883,13 @@
           <a:p>
             <a:r>
               <a:rPr lang="fi-FI" dirty="0"/>
-              <a:t>Music</a:t>
-            </a:r>
+              <a:t>Sound </a:t>
+            </a:r>
+            <a:r>
+              <a:rPr lang="fi-FI" dirty="0" err="1"/>
+              <a:t>effects</a:t>
+            </a:r>
+            <a:endParaRPr lang="fi-FI" dirty="0"/>
           </a:p>
         </p:txBody>
       </p:sp>
@@ -2910,7 +2916,7 @@
           <a:p>
             <a:r>
               <a:rPr lang="fi-FI" dirty="0"/>
-              <a:t>Teemme musiikit vielä päättämättömällä sovelluksella</a:t>
+              <a:t>Teemme äänitehosteet vielä päättämättömällä sovelluksella</a:t>
             </a:r>
           </a:p>
         </p:txBody>
@@ -2918,7 +2924,7 @@
     </p:spTree>
     <p:extLst>
       <p:ext uri="{BB962C8B-B14F-4D97-AF65-F5344CB8AC3E}">
-        <p14:creationId xmlns:p14="http://schemas.microsoft.com/office/powerpoint/2010/main" val="1190275892"/>
+        <p14:creationId xmlns:p14="http://schemas.microsoft.com/office/powerpoint/2010/main" val="451965084"/>
       </p:ext>
     </p:extLst>
   </p:cSld>
@@ -2968,13 +2974,8 @@
           <a:p>
             <a:r>
               <a:rPr lang="fi-FI" dirty="0"/>
-              <a:t>User </a:t>
-            </a:r>
-            <a:r>
-              <a:rPr lang="fi-FI" dirty="0" err="1"/>
-              <a:t>interface</a:t>
-            </a:r>
-            <a:endParaRPr lang="fi-FI" dirty="0"/>
+              <a:t>Music</a:t>
+            </a:r>
           </a:p>
         </p:txBody>
       </p:sp>
@@ -3001,31 +3002,7 @@
           <a:p>
             <a:r>
               <a:rPr lang="fi-FI" dirty="0"/>
-              <a:t>Peliin tulee 2d </a:t>
-            </a:r>
-            <a:r>
-              <a:rPr lang="fi-FI" dirty="0" err="1"/>
-              <a:t>interface</a:t>
-            </a:r>
-            <a:r>
-              <a:rPr lang="fi-FI" dirty="0"/>
-              <a:t> ruudun päälle. </a:t>
-            </a:r>
-            <a:r>
-              <a:rPr lang="fi-FI" dirty="0" err="1"/>
-              <a:t>Interfacessa</a:t>
-            </a:r>
-            <a:r>
-              <a:rPr lang="fi-FI" dirty="0"/>
-              <a:t> näkyy elämäpisteet, rahat, </a:t>
-            </a:r>
-            <a:r>
-              <a:rPr lang="fi-FI" dirty="0" err="1"/>
-              <a:t>powerupit</a:t>
-            </a:r>
-            <a:r>
-              <a:rPr lang="fi-FI" dirty="0"/>
-              <a:t>, sekä vihollisten määrä</a:t>
+              <a:t>Teemme musiikit vielä päättämättömällä sovelluksella</a:t>
             </a:r>
           </a:p>
         </p:txBody>
@@ -3033,7 +3010,7 @@
     </p:spTree>
     <p:extLst>
       <p:ext uri="{BB962C8B-B14F-4D97-AF65-F5344CB8AC3E}">
-        <p14:creationId xmlns:p14="http://schemas.microsoft.com/office/powerpoint/2010/main" val="112440502"/>
+        <p14:creationId xmlns:p14="http://schemas.microsoft.com/office/powerpoint/2010/main" val="1190275892"/>
       </p:ext>
     </p:extLst>
   </p:cSld>
@@ -3082,13 +3059,14 @@
           <a:lstStyle/>
           <a:p>
             <a:r>
+              <a:rPr lang="fi-FI" dirty="0"/>
+              <a:t>User </a:t>
+            </a:r>
+            <a:r>
               <a:rPr lang="fi-FI" dirty="0" err="1"/>
-              <a:t>Game</a:t>
-            </a:r>
-            <a:r>
-              <a:rPr lang="fi-FI" dirty="0"/>
-              <a:t> Controls</a:t>
-            </a:r>
+              <a:t>interface</a:t>
+            </a:r>
+            <a:endParaRPr lang="fi-FI" dirty="0"/>
           </a:p>
         </p:txBody>
       </p:sp>
@@ -3115,15 +3093,31 @@
           <a:p>
             <a:r>
               <a:rPr lang="fi-FI" dirty="0"/>
-              <a:t>Autoa ohjataan tankkikontrolleilla. Vihollisille tulee jonkinlainen tekoäly tai </a:t>
+              <a:t>Peliin tulee 2d </a:t>
             </a:r>
             <a:r>
               <a:rPr lang="fi-FI" dirty="0" err="1"/>
-              <a:t>pathing</a:t>
+              <a:t>interface</a:t>
             </a:r>
             <a:r>
               <a:rPr lang="fi-FI" dirty="0"/>
-              <a:t> jotta ne voivat liikkua ympäri kenttää</a:t>
+              <a:t> ruudun päälle. </a:t>
+            </a:r>
+            <a:r>
+              <a:rPr lang="fi-FI" dirty="0" err="1"/>
+              <a:t>Interfacessa</a:t>
+            </a:r>
+            <a:r>
+              <a:rPr lang="fi-FI" dirty="0"/>
+              <a:t> näkyy elämäpisteet, rahat, </a:t>
+            </a:r>
+            <a:r>
+              <a:rPr lang="fi-FI" dirty="0" err="1"/>
+              <a:t>powerupit</a:t>
+            </a:r>
+            <a:r>
+              <a:rPr lang="fi-FI" dirty="0"/>
+              <a:t>, sekä vihollisten määrä</a:t>
             </a:r>
           </a:p>
         </p:txBody>
@@ -3131,7 +3125,7 @@
     </p:spTree>
     <p:extLst>
       <p:ext uri="{BB962C8B-B14F-4D97-AF65-F5344CB8AC3E}">
-        <p14:creationId xmlns:p14="http://schemas.microsoft.com/office/powerpoint/2010/main" val="2128583162"/>
+        <p14:creationId xmlns:p14="http://schemas.microsoft.com/office/powerpoint/2010/main" val="112440502"/>
       </p:ext>
     </p:extLst>
   </p:cSld>
@@ -3181,9 +3175,12 @@
           <a:p>
             <a:r>
               <a:rPr lang="fi-FI" dirty="0" err="1"/>
-              <a:t>Platform</a:t>
-            </a:r>
-            <a:endParaRPr lang="fi-FI" dirty="0"/>
+              <a:t>Game</a:t>
+            </a:r>
+            <a:r>
+              <a:rPr lang="fi-FI" dirty="0"/>
+              <a:t> Controls</a:t>
+            </a:r>
           </a:p>
         </p:txBody>
       </p:sp>
@@ -3210,7 +3207,15 @@
           <a:p>
             <a:r>
               <a:rPr lang="fi-FI" dirty="0"/>
-              <a:t>Peli tulee tietokoneelle sekä mobiilille</a:t>
+              <a:t>Autoa ohjataan tankkikontrolleilla. Vihollisille tulee jonkinlainen tekoäly tai </a:t>
+            </a:r>
+            <a:r>
+              <a:rPr lang="fi-FI" dirty="0" err="1"/>
+              <a:t>pathing</a:t>
+            </a:r>
+            <a:r>
+              <a:rPr lang="fi-FI" dirty="0"/>
+              <a:t> jotta ne voivat liikkua ympäri kenttää</a:t>
             </a:r>
           </a:p>
         </p:txBody>
@@ -3218,7 +3223,7 @@
     </p:spTree>
     <p:extLst>
       <p:ext uri="{BB962C8B-B14F-4D97-AF65-F5344CB8AC3E}">
-        <p14:creationId xmlns:p14="http://schemas.microsoft.com/office/powerpoint/2010/main" val="1085335576"/>
+        <p14:creationId xmlns:p14="http://schemas.microsoft.com/office/powerpoint/2010/main" val="2128583162"/>
       </p:ext>
     </p:extLst>
   </p:cSld>
@@ -3267,6 +3272,93 @@
           <a:lstStyle/>
           <a:p>
             <a:r>
+              <a:rPr lang="fi-FI" dirty="0" err="1"/>
+              <a:t>Platform</a:t>
+            </a:r>
+            <a:endParaRPr lang="fi-FI" dirty="0"/>
+          </a:p>
+        </p:txBody>
+      </p:sp>
+      <p:sp>
+        <p:nvSpPr>
+          <p:cNvPr id="3" name="Content Placeholder 2">
+            <a:extLst>
+              <a:ext uri="{FF2B5EF4-FFF2-40B4-BE49-F238E27FC236}">
+                <a16:creationId xmlns:a16="http://schemas.microsoft.com/office/drawing/2014/main" id="{375062B3-9444-B54F-9638-F93599D0DBB6}"/>
+              </a:ext>
+            </a:extLst>
+          </p:cNvPr>
+          <p:cNvSpPr>
+            <a:spLocks noGrp="1"/>
+          </p:cNvSpPr>
+          <p:nvPr>
+            <p:ph idx="1"/>
+          </p:nvPr>
+        </p:nvSpPr>
+        <p:spPr/>
+        <p:txBody>
+          <a:bodyPr/>
+          <a:lstStyle/>
+          <a:p>
+            <a:r>
+              <a:rPr lang="fi-FI" dirty="0"/>
+              <a:t>Peli tulee tietokoneelle sekä mobiilille</a:t>
+            </a:r>
+          </a:p>
+        </p:txBody>
+      </p:sp>
+    </p:spTree>
+    <p:extLst>
+      <p:ext uri="{BB962C8B-B14F-4D97-AF65-F5344CB8AC3E}">
+        <p14:creationId xmlns:p14="http://schemas.microsoft.com/office/powerpoint/2010/main" val="1085335576"/>
+      </p:ext>
+    </p:extLst>
+  </p:cSld>
+  <p:clrMapOvr>
+    <a:masterClrMapping/>
+  </p:clrMapOvr>
+</p:sld>
+</file>
+
+<file path=ppt/slides/slide17.xml><?xml version="1.0" encoding="utf-8"?>
+<p:sld xmlns:a="http://schemas.openxmlformats.org/drawingml/2006/main" xmlns:r="http://schemas.openxmlformats.org/officeDocument/2006/relationships" xmlns:p="http://schemas.openxmlformats.org/presentationml/2006/main">
+  <p:cSld>
+    <p:spTree>
+      <p:nvGrpSpPr>
+        <p:cNvPr id="1" name=""/>
+        <p:cNvGrpSpPr/>
+        <p:nvPr/>
+      </p:nvGrpSpPr>
+      <p:grpSpPr>
+        <a:xfrm>
+          <a:off x="0" y="0"/>
+          <a:ext cx="0" cy="0"/>
+          <a:chOff x="0" y="0"/>
+          <a:chExt cx="0" cy="0"/>
+        </a:xfrm>
+      </p:grpSpPr>
+      <p:sp>
+        <p:nvSpPr>
+          <p:cNvPr id="2" name="Title 1">
+            <a:extLst>
+              <a:ext uri="{FF2B5EF4-FFF2-40B4-BE49-F238E27FC236}">
+                <a16:creationId xmlns:a16="http://schemas.microsoft.com/office/drawing/2014/main" id="{F62F4D7C-1835-6C4D-853F-69162F173922}"/>
+              </a:ext>
+            </a:extLst>
+          </p:cNvPr>
+          <p:cNvSpPr>
+            <a:spLocks noGrp="1"/>
+          </p:cNvSpPr>
+          <p:nvPr>
+            <p:ph type="title"/>
+          </p:nvPr>
+        </p:nvSpPr>
+        <p:spPr/>
+        <p:txBody>
+          <a:bodyPr/>
+          <a:lstStyle/>
+          <a:p>
+            <a:r>
               <a:rPr lang="fi-FI" dirty="0"/>
               <a:t>Technical </a:t>
             </a:r>
@@ -3324,7 +3416,7 @@
 </p:sld>
 </file>
 
-<file path=ppt/slides/slide17.xml><?xml version="1.0" encoding="utf-8"?>
+<file path=ppt/slides/slide18.xml><?xml version="1.0" encoding="utf-8"?>
 <p:sld xmlns:a="http://schemas.openxmlformats.org/drawingml/2006/main" xmlns:r="http://schemas.openxmlformats.org/officeDocument/2006/relationships" xmlns:p="http://schemas.openxmlformats.org/presentationml/2006/main">
   <p:cSld>
     <p:spTree>
@@ -4005,7 +4097,7 @@
 </p:sld>
 </file>
 
-<file path=ppt/slides/slide18.xml><?xml version="1.0" encoding="utf-8"?>
+<file path=ppt/slides/slide19.xml><?xml version="1.0" encoding="utf-8"?>
 <p:sld xmlns:a="http://schemas.openxmlformats.org/drawingml/2006/main" xmlns:r="http://schemas.openxmlformats.org/officeDocument/2006/relationships" xmlns:p="http://schemas.openxmlformats.org/presentationml/2006/main">
   <p:cSld>
     <p:spTree>
@@ -4035,7 +4127,82 @@
 </p:sld>
 </file>
 
-<file path=ppt/slides/slide19.xml><?xml version="1.0" encoding="utf-8"?>
+<file path=ppt/slides/slide2.xml><?xml version="1.0" encoding="utf-8"?>
+<p:sld xmlns:a="http://schemas.openxmlformats.org/drawingml/2006/main" xmlns:r="http://schemas.openxmlformats.org/officeDocument/2006/relationships" xmlns:p="http://schemas.openxmlformats.org/presentationml/2006/main">
+  <p:cSld>
+    <p:spTree>
+      <p:nvGrpSpPr>
+        <p:cNvPr id="1" name=""/>
+        <p:cNvGrpSpPr/>
+        <p:nvPr/>
+      </p:nvGrpSpPr>
+      <p:grpSpPr>
+        <a:xfrm>
+          <a:off x="0" y="0"/>
+          <a:ext cx="0" cy="0"/>
+          <a:chOff x="0" y="0"/>
+          <a:chExt cx="0" cy="0"/>
+        </a:xfrm>
+      </p:grpSpPr>
+      <p:sp>
+        <p:nvSpPr>
+          <p:cNvPr id="2" name="Otsikko 1"/>
+          <p:cNvSpPr>
+            <a:spLocks noGrp="1"/>
+          </p:cNvSpPr>
+          <p:nvPr>
+            <p:ph type="title"/>
+          </p:nvPr>
+        </p:nvSpPr>
+        <p:spPr/>
+        <p:txBody>
+          <a:bodyPr/>
+          <a:lstStyle/>
+          <a:p>
+            <a:r>
+              <a:rPr lang="fi-FI" dirty="0" err="1"/>
+              <a:t>Story</a:t>
+            </a:r>
+            <a:endParaRPr lang="fi-FI" dirty="0"/>
+          </a:p>
+        </p:txBody>
+      </p:sp>
+      <p:sp>
+        <p:nvSpPr>
+          <p:cNvPr id="3" name="Sisällön paikkamerkki 2"/>
+          <p:cNvSpPr>
+            <a:spLocks noGrp="1"/>
+          </p:cNvSpPr>
+          <p:nvPr>
+            <p:ph idx="1"/>
+          </p:nvPr>
+        </p:nvSpPr>
+        <p:spPr/>
+        <p:txBody>
+          <a:bodyPr/>
+          <a:lstStyle/>
+          <a:p>
+            <a:r>
+              <a:rPr lang="fi-FI" dirty="0"/>
+              <a:t>Pelillä ei ole vielä varsinaista tarinaa</a:t>
+            </a:r>
+          </a:p>
+        </p:txBody>
+      </p:sp>
+    </p:spTree>
+    <p:extLst>
+      <p:ext uri="{BB962C8B-B14F-4D97-AF65-F5344CB8AC3E}">
+        <p14:creationId xmlns:p14="http://schemas.microsoft.com/office/powerpoint/2010/main" val="23988595"/>
+      </p:ext>
+    </p:extLst>
+  </p:cSld>
+  <p:clrMapOvr>
+    <a:masterClrMapping/>
+  </p:clrMapOvr>
+</p:sld>
+</file>
+
+<file path=ppt/slides/slide20.xml><?xml version="1.0" encoding="utf-8"?>
 <p:sld xmlns:a="http://schemas.openxmlformats.org/drawingml/2006/main" xmlns:r="http://schemas.openxmlformats.org/officeDocument/2006/relationships" xmlns:p="http://schemas.openxmlformats.org/presentationml/2006/main">
   <p:cSld>
     <p:spTree>
@@ -4056,81 +4223,6 @@
     <p:extLst>
       <p:ext uri="{BB962C8B-B14F-4D97-AF65-F5344CB8AC3E}">
         <p14:creationId xmlns:p14="http://schemas.microsoft.com/office/powerpoint/2010/main" val="1578200342"/>
-      </p:ext>
-    </p:extLst>
-  </p:cSld>
-  <p:clrMapOvr>
-    <a:masterClrMapping/>
-  </p:clrMapOvr>
-</p:sld>
-</file>
-
-<file path=ppt/slides/slide2.xml><?xml version="1.0" encoding="utf-8"?>
-<p:sld xmlns:a="http://schemas.openxmlformats.org/drawingml/2006/main" xmlns:r="http://schemas.openxmlformats.org/officeDocument/2006/relationships" xmlns:p="http://schemas.openxmlformats.org/presentationml/2006/main">
-  <p:cSld>
-    <p:spTree>
-      <p:nvGrpSpPr>
-        <p:cNvPr id="1" name=""/>
-        <p:cNvGrpSpPr/>
-        <p:nvPr/>
-      </p:nvGrpSpPr>
-      <p:grpSpPr>
-        <a:xfrm>
-          <a:off x="0" y="0"/>
-          <a:ext cx="0" cy="0"/>
-          <a:chOff x="0" y="0"/>
-          <a:chExt cx="0" cy="0"/>
-        </a:xfrm>
-      </p:grpSpPr>
-      <p:sp>
-        <p:nvSpPr>
-          <p:cNvPr id="2" name="Otsikko 1"/>
-          <p:cNvSpPr>
-            <a:spLocks noGrp="1"/>
-          </p:cNvSpPr>
-          <p:nvPr>
-            <p:ph type="title"/>
-          </p:nvPr>
-        </p:nvSpPr>
-        <p:spPr/>
-        <p:txBody>
-          <a:bodyPr/>
-          <a:lstStyle/>
-          <a:p>
-            <a:r>
-              <a:rPr lang="fi-FI" dirty="0" err="1"/>
-              <a:t>Story</a:t>
-            </a:r>
-            <a:endParaRPr lang="fi-FI" dirty="0"/>
-          </a:p>
-        </p:txBody>
-      </p:sp>
-      <p:sp>
-        <p:nvSpPr>
-          <p:cNvPr id="3" name="Sisällön paikkamerkki 2"/>
-          <p:cNvSpPr>
-            <a:spLocks noGrp="1"/>
-          </p:cNvSpPr>
-          <p:nvPr>
-            <p:ph idx="1"/>
-          </p:nvPr>
-        </p:nvSpPr>
-        <p:spPr/>
-        <p:txBody>
-          <a:bodyPr/>
-          <a:lstStyle/>
-          <a:p>
-            <a:r>
-              <a:rPr lang="fi-FI" dirty="0"/>
-              <a:t>Pelillä ei ole vielä varsinaista tarinaa</a:t>
-            </a:r>
-          </a:p>
-        </p:txBody>
-      </p:sp>
-    </p:spTree>
-    <p:extLst>
-      <p:ext uri="{BB962C8B-B14F-4D97-AF65-F5344CB8AC3E}">
-        <p14:creationId xmlns:p14="http://schemas.microsoft.com/office/powerpoint/2010/main" val="23988595"/>
       </p:ext>
     </p:extLst>
   </p:cSld>
@@ -4255,7 +4347,7 @@
           <p:cNvPr id="2" name="Title 1">
             <a:extLst>
               <a:ext uri="{FF2B5EF4-FFF2-40B4-BE49-F238E27FC236}">
-                <a16:creationId xmlns:a16="http://schemas.microsoft.com/office/drawing/2014/main" id="{F62F4D7C-1835-6C4D-853F-69162F173922}"/>
+                <a16:creationId xmlns:a16="http://schemas.microsoft.com/office/drawing/2014/main" id="{90C45852-7626-43CB-80DD-C2D6D0BD17F9}"/>
               </a:ext>
             </a:extLst>
           </p:cNvPr>
@@ -4272,9 +4364,18 @@
           <a:lstStyle/>
           <a:p>
             <a:r>
-              <a:rPr lang="fi-FI" dirty="0"/>
-              <a:t>Environment design</a:t>
-            </a:r>
+              <a:rPr lang="en-US" dirty="0"/>
+              <a:t>Car characters(ideas/</a:t>
+            </a:r>
+            <a:r>
+              <a:rPr lang="en-US" dirty="0" err="1"/>
+              <a:t>todolist</a:t>
+            </a:r>
+            <a:r>
+              <a:rPr lang="en-US" dirty="0"/>
+              <a:t>)</a:t>
+            </a:r>
+            <a:endParaRPr lang="en-FI" dirty="0"/>
           </a:p>
         </p:txBody>
       </p:sp>
@@ -4283,7 +4384,7 @@
           <p:cNvPr id="3" name="Content Placeholder 2">
             <a:extLst>
               <a:ext uri="{FF2B5EF4-FFF2-40B4-BE49-F238E27FC236}">
-                <a16:creationId xmlns:a16="http://schemas.microsoft.com/office/drawing/2014/main" id="{375062B3-9444-B54F-9638-F93599D0DBB6}"/>
+                <a16:creationId xmlns:a16="http://schemas.microsoft.com/office/drawing/2014/main" id="{94CBBD68-59A8-4E28-9AB0-961E50972107}"/>
               </a:ext>
             </a:extLst>
           </p:cNvPr>
@@ -4299,14 +4400,42 @@
           <a:bodyPr/>
           <a:lstStyle/>
           <a:p>
-            <a:endParaRPr lang="fi-FI"/>
+            <a:r>
+              <a:rPr lang="en-US" dirty="0"/>
+              <a:t>1994-1999 </a:t>
+            </a:r>
+            <a:r>
+              <a:rPr lang="en-US"/>
+              <a:t>Toyota Celica GT4 </a:t>
+            </a:r>
+            <a:r>
+              <a:rPr lang="en-US" dirty="0"/>
+              <a:t>(Finding references)</a:t>
+            </a:r>
+          </a:p>
+          <a:p>
+            <a:r>
+              <a:rPr lang="en-US" dirty="0"/>
+              <a:t>More </a:t>
+            </a:r>
+            <a:r>
+              <a:rPr lang="en-US" dirty="0" err="1"/>
+              <a:t>miatas</a:t>
+            </a:r>
+            <a:endParaRPr lang="en-US" dirty="0"/>
+          </a:p>
+          <a:p>
+            <a:r>
+              <a:rPr lang="en-US" dirty="0"/>
+              <a:t>Subaru 22b 1998</a:t>
+            </a:r>
           </a:p>
         </p:txBody>
       </p:sp>
     </p:spTree>
     <p:extLst>
       <p:ext uri="{BB962C8B-B14F-4D97-AF65-F5344CB8AC3E}">
-        <p14:creationId xmlns:p14="http://schemas.microsoft.com/office/powerpoint/2010/main" val="906116819"/>
+        <p14:creationId xmlns:p14="http://schemas.microsoft.com/office/powerpoint/2010/main" val="3267571852"/>
       </p:ext>
     </p:extLst>
   </p:cSld>
@@ -4356,7 +4485,7 @@
           <a:p>
             <a:r>
               <a:rPr lang="fi-FI" dirty="0"/>
-              <a:t>Level design</a:t>
+              <a:t>Environment design</a:t>
             </a:r>
           </a:p>
         </p:txBody>
@@ -4382,17 +4511,14 @@
           <a:bodyPr/>
           <a:lstStyle/>
           <a:p>
-            <a:r>
-              <a:rPr lang="fi-FI" dirty="0"/>
-              <a:t>Peliin tulee eri tasoja, kuten hautausmaa</a:t>
-            </a:r>
+            <a:endParaRPr lang="fi-FI"/>
           </a:p>
         </p:txBody>
       </p:sp>
     </p:spTree>
     <p:extLst>
       <p:ext uri="{BB962C8B-B14F-4D97-AF65-F5344CB8AC3E}">
-        <p14:creationId xmlns:p14="http://schemas.microsoft.com/office/powerpoint/2010/main" val="3170286087"/>
+        <p14:creationId xmlns:p14="http://schemas.microsoft.com/office/powerpoint/2010/main" val="906116819"/>
       </p:ext>
     </p:extLst>
   </p:cSld>
@@ -4441,10 +4567,9 @@
           <a:lstStyle/>
           <a:p>
             <a:r>
-              <a:rPr lang="fi-FI" dirty="0" err="1"/>
-              <a:t>Gameplay</a:t>
-            </a:r>
-            <a:endParaRPr lang="fi-FI" dirty="0"/>
+              <a:rPr lang="fi-FI" dirty="0"/>
+              <a:t>Level design</a:t>
+            </a:r>
           </a:p>
         </p:txBody>
       </p:sp>
@@ -4471,7 +4596,7 @@
           <a:p>
             <a:r>
               <a:rPr lang="fi-FI" dirty="0"/>
-              <a:t>Pelissä ajetaan autolla vihollisten yli, varoen, että ne eivät hyökkää auton kylkiin tai perään</a:t>
+              <a:t>Peliin tulee eri tasoja, kuten hautausmaa</a:t>
             </a:r>
           </a:p>
         </p:txBody>
@@ -4479,7 +4604,7 @@
     </p:spTree>
     <p:extLst>
       <p:ext uri="{BB962C8B-B14F-4D97-AF65-F5344CB8AC3E}">
-        <p14:creationId xmlns:p14="http://schemas.microsoft.com/office/powerpoint/2010/main" val="1962336998"/>
+        <p14:creationId xmlns:p14="http://schemas.microsoft.com/office/powerpoint/2010/main" val="3170286087"/>
       </p:ext>
     </p:extLst>
   </p:cSld>
@@ -4511,7 +4636,7 @@
           <p:cNvPr id="2" name="Title 1">
             <a:extLst>
               <a:ext uri="{FF2B5EF4-FFF2-40B4-BE49-F238E27FC236}">
-                <a16:creationId xmlns:a16="http://schemas.microsoft.com/office/drawing/2014/main" id="{1C30B1D4-B797-3140-8E1F-A339ADDC6AD2}"/>
+                <a16:creationId xmlns:a16="http://schemas.microsoft.com/office/drawing/2014/main" id="{F62F4D7C-1835-6C4D-853F-69162F173922}"/>
               </a:ext>
             </a:extLst>
           </p:cNvPr>
@@ -4528,9 +4653,10 @@
           <a:lstStyle/>
           <a:p>
             <a:r>
-              <a:rPr lang="fi-FI" dirty="0"/>
-              <a:t>Progression</a:t>
-            </a:r>
+              <a:rPr lang="fi-FI" dirty="0" err="1"/>
+              <a:t>Gameplay</a:t>
+            </a:r>
+            <a:endParaRPr lang="fi-FI" dirty="0"/>
           </a:p>
         </p:txBody>
       </p:sp>
@@ -4539,7 +4665,7 @@
           <p:cNvPr id="3" name="Content Placeholder 2">
             <a:extLst>
               <a:ext uri="{FF2B5EF4-FFF2-40B4-BE49-F238E27FC236}">
-                <a16:creationId xmlns:a16="http://schemas.microsoft.com/office/drawing/2014/main" id="{289CC9B2-03DC-D644-94C6-0E4EA13C8655}"/>
+                <a16:creationId xmlns:a16="http://schemas.microsoft.com/office/drawing/2014/main" id="{375062B3-9444-B54F-9638-F93599D0DBB6}"/>
               </a:ext>
             </a:extLst>
           </p:cNvPr>
@@ -4557,27 +4683,7 @@
           <a:p>
             <a:r>
               <a:rPr lang="fi-FI" dirty="0"/>
-              <a:t>Peliin tulee eri kenttiä</a:t>
-            </a:r>
-          </a:p>
-          <a:p>
-            <a:r>
-              <a:rPr lang="fi-FI" dirty="0"/>
-              <a:t>Peliin tulee </a:t>
-            </a:r>
-            <a:r>
-              <a:rPr lang="fi-FI" dirty="0" err="1"/>
-              <a:t>poweruppeja</a:t>
-            </a:r>
-            <a:r>
-              <a:rPr lang="fi-FI" dirty="0"/>
-              <a:t> ja muita kehitysmahdollisuuksia</a:t>
-            </a:r>
-          </a:p>
-          <a:p>
-            <a:r>
-              <a:rPr lang="fi-FI" dirty="0"/>
-              <a:t>Peliin tulee eri autoja</a:t>
+              <a:t>Pelissä ajetaan autolla vihollisten yli, varoen, että ne eivät hyökkää auton kylkiin tai perään</a:t>
             </a:r>
           </a:p>
         </p:txBody>
@@ -4585,7 +4691,7 @@
     </p:spTree>
     <p:extLst>
       <p:ext uri="{BB962C8B-B14F-4D97-AF65-F5344CB8AC3E}">
-        <p14:creationId xmlns:p14="http://schemas.microsoft.com/office/powerpoint/2010/main" val="3189461585"/>
+        <p14:creationId xmlns:p14="http://schemas.microsoft.com/office/powerpoint/2010/main" val="1962336998"/>
       </p:ext>
     </p:extLst>
   </p:cSld>
@@ -4617,7 +4723,7 @@
           <p:cNvPr id="2" name="Title 1">
             <a:extLst>
               <a:ext uri="{FF2B5EF4-FFF2-40B4-BE49-F238E27FC236}">
-                <a16:creationId xmlns:a16="http://schemas.microsoft.com/office/drawing/2014/main" id="{F62F4D7C-1835-6C4D-853F-69162F173922}"/>
+                <a16:creationId xmlns:a16="http://schemas.microsoft.com/office/drawing/2014/main" id="{1C30B1D4-B797-3140-8E1F-A339ADDC6AD2}"/>
               </a:ext>
             </a:extLst>
           </p:cNvPr>
@@ -4634,10 +4740,9 @@
           <a:lstStyle/>
           <a:p>
             <a:r>
-              <a:rPr lang="fi-FI" dirty="0" err="1"/>
-              <a:t>Monetization</a:t>
-            </a:r>
-            <a:endParaRPr lang="fi-FI" dirty="0"/>
+              <a:rPr lang="fi-FI" dirty="0"/>
+              <a:t>Progression</a:t>
+            </a:r>
           </a:p>
         </p:txBody>
       </p:sp>
@@ -4646,7 +4751,7 @@
           <p:cNvPr id="3" name="Content Placeholder 2">
             <a:extLst>
               <a:ext uri="{FF2B5EF4-FFF2-40B4-BE49-F238E27FC236}">
-                <a16:creationId xmlns:a16="http://schemas.microsoft.com/office/drawing/2014/main" id="{375062B3-9444-B54F-9638-F93599D0DBB6}"/>
+                <a16:creationId xmlns:a16="http://schemas.microsoft.com/office/drawing/2014/main" id="{289CC9B2-03DC-D644-94C6-0E4EA13C8655}"/>
               </a:ext>
             </a:extLst>
           </p:cNvPr>
@@ -4662,14 +4767,37 @@
           <a:bodyPr/>
           <a:lstStyle/>
           <a:p>
-            <a:endParaRPr lang="fi-FI"/>
+            <a:r>
+              <a:rPr lang="fi-FI" dirty="0"/>
+              <a:t>Peliin tulee eri kenttiä</a:t>
+            </a:r>
+          </a:p>
+          <a:p>
+            <a:r>
+              <a:rPr lang="fi-FI" dirty="0"/>
+              <a:t>Peliin tulee </a:t>
+            </a:r>
+            <a:r>
+              <a:rPr lang="fi-FI" dirty="0" err="1"/>
+              <a:t>poweruppeja</a:t>
+            </a:r>
+            <a:r>
+              <a:rPr lang="fi-FI" dirty="0"/>
+              <a:t> ja muita kehitysmahdollisuuksia</a:t>
+            </a:r>
+          </a:p>
+          <a:p>
+            <a:r>
+              <a:rPr lang="fi-FI" dirty="0"/>
+              <a:t>Peliin tulee eri autoja</a:t>
+            </a:r>
           </a:p>
         </p:txBody>
       </p:sp>
     </p:spTree>
     <p:extLst>
       <p:ext uri="{BB962C8B-B14F-4D97-AF65-F5344CB8AC3E}">
-        <p14:creationId xmlns:p14="http://schemas.microsoft.com/office/powerpoint/2010/main" val="2913771643"/>
+        <p14:creationId xmlns:p14="http://schemas.microsoft.com/office/powerpoint/2010/main" val="3189461585"/>
       </p:ext>
     </p:extLst>
   </p:cSld>
@@ -4701,7 +4829,7 @@
           <p:cNvPr id="2" name="Title 1">
             <a:extLst>
               <a:ext uri="{FF2B5EF4-FFF2-40B4-BE49-F238E27FC236}">
-                <a16:creationId xmlns:a16="http://schemas.microsoft.com/office/drawing/2014/main" id="{E47C2959-08B0-A14E-8524-834AAF69BA68}"/>
+                <a16:creationId xmlns:a16="http://schemas.microsoft.com/office/drawing/2014/main" id="{F62F4D7C-1835-6C4D-853F-69162F173922}"/>
               </a:ext>
             </a:extLst>
           </p:cNvPr>
@@ -4719,16 +4847,9 @@
           <a:p>
             <a:r>
               <a:rPr lang="fi-FI" dirty="0" err="1"/>
-              <a:t>Rules</a:t>
-            </a:r>
-            <a:r>
-              <a:rPr lang="fi-FI" dirty="0"/>
-              <a:t> </a:t>
-            </a:r>
-            <a:r>
-              <a:rPr lang="fi-FI"/>
-              <a:t>flowchart</a:t>
-            </a:r>
+              <a:t>Monetization</a:t>
+            </a:r>
+            <a:endParaRPr lang="fi-FI" dirty="0"/>
           </a:p>
         </p:txBody>
       </p:sp>
@@ -4737,7 +4858,7 @@
           <p:cNvPr id="3" name="Content Placeholder 2">
             <a:extLst>
               <a:ext uri="{FF2B5EF4-FFF2-40B4-BE49-F238E27FC236}">
-                <a16:creationId xmlns:a16="http://schemas.microsoft.com/office/drawing/2014/main" id="{2349ED59-99FD-FE46-8CCC-DC99627F92CE}"/>
+                <a16:creationId xmlns:a16="http://schemas.microsoft.com/office/drawing/2014/main" id="{375062B3-9444-B54F-9638-F93599D0DBB6}"/>
               </a:ext>
             </a:extLst>
           </p:cNvPr>
@@ -4760,7 +4881,7 @@
     </p:spTree>
     <p:extLst>
       <p:ext uri="{BB962C8B-B14F-4D97-AF65-F5344CB8AC3E}">
-        <p14:creationId xmlns:p14="http://schemas.microsoft.com/office/powerpoint/2010/main" val="839165852"/>
+        <p14:creationId xmlns:p14="http://schemas.microsoft.com/office/powerpoint/2010/main" val="2913771643"/>
       </p:ext>
     </p:extLst>
   </p:cSld>
@@ -5096,6 +5217,15 @@
 </file>
 
 <file path=customXml/item1.xml><?xml version="1.0" encoding="utf-8"?>
+<?mso-contentType ?>
+<FormTemplates xmlns="http://schemas.microsoft.com/sharepoint/v3/contenttype/forms">
+  <Display>DocumentLibraryForm</Display>
+  <Edit>DocumentLibraryForm</Edit>
+  <New>DocumentLibraryForm</New>
+</FormTemplates>
+</file>
+
+<file path=customXml/item2.xml><?xml version="1.0" encoding="utf-8"?>
 <ct:contentTypeSchema xmlns:ct="http://schemas.microsoft.com/office/2006/metadata/contentType" xmlns:ma="http://schemas.microsoft.com/office/2006/metadata/properties/metaAttributes" ct:_="" ma:_="" ma:contentTypeName="Asiakirja" ma:contentTypeID="0x01010049E0788EA5136D47BE4A87530CD70557" ma:contentTypeVersion="1" ma:contentTypeDescription="Luo uusi asiakirja." ma:contentTypeScope="" ma:versionID="ede70b98b5f10b1696a9aa215d9fda8c">
   <xsd:schema xmlns:xsd="http://www.w3.org/2001/XMLSchema" xmlns:xs="http://www.w3.org/2001/XMLSchema" xmlns:p="http://schemas.microsoft.com/office/2006/metadata/properties" xmlns:ns1="http://schemas.microsoft.com/sharepoint/v3" targetNamespace="http://schemas.microsoft.com/office/2006/metadata/properties" ma:root="true" ma:fieldsID="ec41fa38566c5dfcabfa1df2b84f69da" ns1:_="">
     <xsd:import namespace="http://schemas.microsoft.com/sharepoint/v3"/>
@@ -5227,15 +5357,6 @@
 </ct:contentTypeSchema>
 </file>
 
-<file path=customXml/item2.xml><?xml version="1.0" encoding="utf-8"?>
-<?mso-contentType ?>
-<FormTemplates xmlns="http://schemas.microsoft.com/sharepoint/v3/contenttype/forms">
-  <Display>DocumentLibraryForm</Display>
-  <Edit>DocumentLibraryForm</Edit>
-  <New>DocumentLibraryForm</New>
-</FormTemplates>
-</file>
-
 <file path=customXml/item3.xml><?xml version="1.0" encoding="utf-8"?>
 <p:properties xmlns:p="http://schemas.microsoft.com/office/2006/metadata/properties" xmlns:xsi="http://www.w3.org/2001/XMLSchema-instance" xmlns:pc="http://schemas.microsoft.com/office/infopath/2007/PartnerControls">
   <documentManagement>
@@ -5246,6 +5367,14 @@
 </file>
 
 <file path=customXml/itemProps1.xml><?xml version="1.0" encoding="utf-8"?>
+<ds:datastoreItem xmlns:ds="http://schemas.openxmlformats.org/officeDocument/2006/customXml" ds:itemID="{A1AD96FD-15D2-4BDA-BA84-83C05016785B}">
+  <ds:schemaRefs>
+    <ds:schemaRef ds:uri="http://schemas.microsoft.com/sharepoint/v3/contenttype/forms"/>
+  </ds:schemaRefs>
+</ds:datastoreItem>
+</file>
+
+<file path=customXml/itemProps2.xml><?xml version="1.0" encoding="utf-8"?>
 <ds:datastoreItem xmlns:ds="http://schemas.openxmlformats.org/officeDocument/2006/customXml" ds:itemID="{EDEB17FF-D8EC-42BB-B454-06DA05186CD0}">
   <ds:schemaRefs>
     <ds:schemaRef ds:uri="http://schemas.microsoft.com/office/2006/metadata/contentType"/>
@@ -5263,14 +5392,6 @@
 </ds:datastoreItem>
 </file>
 
-<file path=customXml/itemProps2.xml><?xml version="1.0" encoding="utf-8"?>
-<ds:datastoreItem xmlns:ds="http://schemas.openxmlformats.org/officeDocument/2006/customXml" ds:itemID="{A1AD96FD-15D2-4BDA-BA84-83C05016785B}">
-  <ds:schemaRefs>
-    <ds:schemaRef ds:uri="http://schemas.microsoft.com/sharepoint/v3/contenttype/forms"/>
-  </ds:schemaRefs>
-</ds:datastoreItem>
-</file>
-
 <file path=customXml/itemProps3.xml><?xml version="1.0" encoding="utf-8"?>
 <ds:datastoreItem xmlns:ds="http://schemas.openxmlformats.org/officeDocument/2006/customXml" ds:itemID="{1C978AD4-76C8-4B46-BD91-22FA7713E7C1}">
   <ds:schemaRefs>

</xml_diff>